<commit_message>
Fixed tree for tests
</commit_message>
<xml_diff>
--- a/ResearchTreeSample.pptx
+++ b/ResearchTreeSample.pptx
@@ -104,6 +104,11 @@
       </a:defRPr>
     </a:lvl9pPr>
   </p:defaultTextStyle>
+  <p:extLst>
+    <p:ext uri="{EFAFB233-063F-42B5-8137-9DF3F51BA10A}">
+      <p15:sldGuideLst xmlns:p15="http://schemas.microsoft.com/office/powerpoint/2012/main"/>
+    </p:ext>
+  </p:extLst>
 </p:presentation>
 </file>
 
@@ -254,7 +259,7 @@
           <a:p>
             <a:fld id="{6BB7B63E-2AB3-4C0F-8A1D-4B9B2FD4B843}" type="datetimeFigureOut">
               <a:rPr lang="en-US" smtClean="0"/>
-              <a:t>2/13/2022</a:t>
+              <a:t>2/18/2022</a:t>
             </a:fld>
             <a:endParaRPr lang="en-US"/>
           </a:p>
@@ -452,7 +457,7 @@
           <a:p>
             <a:fld id="{6BB7B63E-2AB3-4C0F-8A1D-4B9B2FD4B843}" type="datetimeFigureOut">
               <a:rPr lang="en-US" smtClean="0"/>
-              <a:t>2/13/2022</a:t>
+              <a:t>2/18/2022</a:t>
             </a:fld>
             <a:endParaRPr lang="en-US"/>
           </a:p>
@@ -660,7 +665,7 @@
           <a:p>
             <a:fld id="{6BB7B63E-2AB3-4C0F-8A1D-4B9B2FD4B843}" type="datetimeFigureOut">
               <a:rPr lang="en-US" smtClean="0"/>
-              <a:t>2/13/2022</a:t>
+              <a:t>2/18/2022</a:t>
             </a:fld>
             <a:endParaRPr lang="en-US"/>
           </a:p>
@@ -858,7 +863,7 @@
           <a:p>
             <a:fld id="{6BB7B63E-2AB3-4C0F-8A1D-4B9B2FD4B843}" type="datetimeFigureOut">
               <a:rPr lang="en-US" smtClean="0"/>
-              <a:t>2/13/2022</a:t>
+              <a:t>2/18/2022</a:t>
             </a:fld>
             <a:endParaRPr lang="en-US"/>
           </a:p>
@@ -1133,7 +1138,7 @@
           <a:p>
             <a:fld id="{6BB7B63E-2AB3-4C0F-8A1D-4B9B2FD4B843}" type="datetimeFigureOut">
               <a:rPr lang="en-US" smtClean="0"/>
-              <a:t>2/13/2022</a:t>
+              <a:t>2/18/2022</a:t>
             </a:fld>
             <a:endParaRPr lang="en-US"/>
           </a:p>
@@ -1398,7 +1403,7 @@
           <a:p>
             <a:fld id="{6BB7B63E-2AB3-4C0F-8A1D-4B9B2FD4B843}" type="datetimeFigureOut">
               <a:rPr lang="en-US" smtClean="0"/>
-              <a:t>2/13/2022</a:t>
+              <a:t>2/18/2022</a:t>
             </a:fld>
             <a:endParaRPr lang="en-US"/>
           </a:p>
@@ -1810,7 +1815,7 @@
           <a:p>
             <a:fld id="{6BB7B63E-2AB3-4C0F-8A1D-4B9B2FD4B843}" type="datetimeFigureOut">
               <a:rPr lang="en-US" smtClean="0"/>
-              <a:t>2/13/2022</a:t>
+              <a:t>2/18/2022</a:t>
             </a:fld>
             <a:endParaRPr lang="en-US"/>
           </a:p>
@@ -1951,7 +1956,7 @@
           <a:p>
             <a:fld id="{6BB7B63E-2AB3-4C0F-8A1D-4B9B2FD4B843}" type="datetimeFigureOut">
               <a:rPr lang="en-US" smtClean="0"/>
-              <a:t>2/13/2022</a:t>
+              <a:t>2/18/2022</a:t>
             </a:fld>
             <a:endParaRPr lang="en-US"/>
           </a:p>
@@ -2064,7 +2069,7 @@
           <a:p>
             <a:fld id="{6BB7B63E-2AB3-4C0F-8A1D-4B9B2FD4B843}" type="datetimeFigureOut">
               <a:rPr lang="en-US" smtClean="0"/>
-              <a:t>2/13/2022</a:t>
+              <a:t>2/18/2022</a:t>
             </a:fld>
             <a:endParaRPr lang="en-US"/>
           </a:p>
@@ -2375,7 +2380,7 @@
           <a:p>
             <a:fld id="{6BB7B63E-2AB3-4C0F-8A1D-4B9B2FD4B843}" type="datetimeFigureOut">
               <a:rPr lang="en-US" smtClean="0"/>
-              <a:t>2/13/2022</a:t>
+              <a:t>2/18/2022</a:t>
             </a:fld>
             <a:endParaRPr lang="en-US"/>
           </a:p>
@@ -2663,7 +2668,7 @@
           <a:p>
             <a:fld id="{6BB7B63E-2AB3-4C0F-8A1D-4B9B2FD4B843}" type="datetimeFigureOut">
               <a:rPr lang="en-US" smtClean="0"/>
-              <a:t>2/13/2022</a:t>
+              <a:t>2/18/2022</a:t>
             </a:fld>
             <a:endParaRPr lang="en-US"/>
           </a:p>
@@ -2904,7 +2909,7 @@
           <a:p>
             <a:fld id="{6BB7B63E-2AB3-4C0F-8A1D-4B9B2FD4B843}" type="datetimeFigureOut">
               <a:rPr lang="en-US" smtClean="0"/>
-              <a:t>2/13/2022</a:t>
+              <a:t>2/18/2022</a:t>
             </a:fld>
             <a:endParaRPr lang="en-US"/>
           </a:p>
@@ -3335,7 +3340,7 @@
         </p:nvSpPr>
         <p:spPr>
           <a:xfrm>
-            <a:off x="915802" y="2929554"/>
+            <a:off x="721551" y="2171502"/>
             <a:ext cx="1533834" cy="914400"/>
           </a:xfrm>
           <a:prstGeom prst="roundRect">
@@ -3389,7 +3394,7 @@
         </p:nvSpPr>
         <p:spPr>
           <a:xfrm>
-            <a:off x="3187740" y="2015154"/>
+            <a:off x="2993489" y="1257102"/>
             <a:ext cx="1533834" cy="914400"/>
           </a:xfrm>
           <a:prstGeom prst="roundRect">
@@ -3443,7 +3448,7 @@
         </p:nvSpPr>
         <p:spPr>
           <a:xfrm>
-            <a:off x="3187740" y="3843954"/>
+            <a:off x="2993489" y="3085902"/>
             <a:ext cx="1533834" cy="914400"/>
           </a:xfrm>
           <a:prstGeom prst="roundRect">
@@ -3497,7 +3502,7 @@
         </p:nvSpPr>
         <p:spPr>
           <a:xfrm>
-            <a:off x="5459680" y="2929554"/>
+            <a:off x="5265429" y="2171502"/>
             <a:ext cx="1533834" cy="914400"/>
           </a:xfrm>
           <a:prstGeom prst="roundRect">
@@ -3551,7 +3556,7 @@
         </p:nvSpPr>
         <p:spPr>
           <a:xfrm>
-            <a:off x="10003557" y="2929554"/>
+            <a:off x="9809306" y="2171502"/>
             <a:ext cx="1533834" cy="914400"/>
           </a:xfrm>
           <a:prstGeom prst="roundRect">
@@ -3605,7 +3610,7 @@
         </p:nvSpPr>
         <p:spPr>
           <a:xfrm>
-            <a:off x="7731619" y="2929554"/>
+            <a:off x="7537368" y="2171502"/>
             <a:ext cx="1533834" cy="914400"/>
           </a:xfrm>
           <a:prstGeom prst="roundRect">
@@ -3659,7 +3664,7 @@
         </p:nvSpPr>
         <p:spPr>
           <a:xfrm>
-            <a:off x="7731619" y="1100754"/>
+            <a:off x="7537368" y="799902"/>
             <a:ext cx="1533834" cy="914400"/>
           </a:xfrm>
           <a:prstGeom prst="roundRect">
@@ -3717,7 +3722,7 @@
         </p:nvCxnSpPr>
         <p:spPr>
           <a:xfrm>
-            <a:off x="2449636" y="3386754"/>
+            <a:off x="2255385" y="2628702"/>
             <a:ext cx="738104" cy="914400"/>
           </a:xfrm>
           <a:prstGeom prst="bentConnector3">
@@ -3760,7 +3765,7 @@
         </p:nvCxnSpPr>
         <p:spPr>
           <a:xfrm flipV="1">
-            <a:off x="2449636" y="2472354"/>
+            <a:off x="2255385" y="1714302"/>
             <a:ext cx="738104" cy="914400"/>
           </a:xfrm>
           <a:prstGeom prst="bentConnector3">
@@ -3805,7 +3810,7 @@
         </p:nvCxnSpPr>
         <p:spPr>
           <a:xfrm>
-            <a:off x="4721574" y="2472354"/>
+            <a:off x="4527323" y="1714302"/>
             <a:ext cx="738106" cy="914400"/>
           </a:xfrm>
           <a:prstGeom prst="bentConnector3">
@@ -3850,7 +3855,7 @@
         </p:nvCxnSpPr>
         <p:spPr>
           <a:xfrm flipV="1">
-            <a:off x="4721574" y="3386754"/>
+            <a:off x="4527323" y="2628702"/>
             <a:ext cx="738106" cy="914400"/>
           </a:xfrm>
           <a:prstGeom prst="bentConnector3">
@@ -3893,8 +3898,8 @@
         </p:nvCxnSpPr>
         <p:spPr>
           <a:xfrm flipV="1">
-            <a:off x="6993514" y="1557954"/>
-            <a:ext cx="738105" cy="1828800"/>
+            <a:off x="6799263" y="1257102"/>
+            <a:ext cx="738105" cy="1371600"/>
           </a:xfrm>
           <a:prstGeom prst="bentConnector3">
             <a:avLst>
@@ -3937,7 +3942,7 @@
         </p:nvCxnSpPr>
         <p:spPr>
           <a:xfrm>
-            <a:off x="6993514" y="3386754"/>
+            <a:off x="6799263" y="2628702"/>
             <a:ext cx="738105" cy="0"/>
           </a:xfrm>
           <a:prstGeom prst="straightConnector1">
@@ -3980,11 +3985,155 @@
         </p:nvCxnSpPr>
         <p:spPr>
           <a:xfrm>
-            <a:off x="9265453" y="3386754"/>
+            <a:off x="9071202" y="2628702"/>
             <a:ext cx="738104" cy="0"/>
           </a:xfrm>
           <a:prstGeom prst="straightConnector1">
             <a:avLst/>
+          </a:prstGeom>
+          <a:ln w="28575">
+            <a:tailEnd type="triangle"/>
+          </a:ln>
+        </p:spPr>
+        <p:style>
+          <a:lnRef idx="1">
+            <a:schemeClr val="accent1"/>
+          </a:lnRef>
+          <a:fillRef idx="0">
+            <a:schemeClr val="accent1"/>
+          </a:fillRef>
+          <a:effectRef idx="0">
+            <a:schemeClr val="accent1"/>
+          </a:effectRef>
+          <a:fontRef idx="minor">
+            <a:schemeClr val="tx1"/>
+          </a:fontRef>
+        </p:style>
+      </p:cxnSp>
+      <p:sp>
+        <p:nvSpPr>
+          <p:cNvPr id="16" name="Rectangle: Rounded Corners 15">
+            <a:extLst>
+              <a:ext uri="{FF2B5EF4-FFF2-40B4-BE49-F238E27FC236}">
+                <a16:creationId xmlns:a16="http://schemas.microsoft.com/office/drawing/2014/main" id="{AC8FEE0F-1FAD-4FFB-A588-4F010AD63058}"/>
+              </a:ext>
+            </a:extLst>
+          </p:cNvPr>
+          <p:cNvSpPr/>
+          <p:nvPr/>
+        </p:nvSpPr>
+        <p:spPr>
+          <a:xfrm>
+            <a:off x="2993489" y="4914702"/>
+            <a:ext cx="1533834" cy="914400"/>
+          </a:xfrm>
+          <a:prstGeom prst="roundRect">
+            <a:avLst/>
+          </a:prstGeom>
+          <a:ln>
+            <a:solidFill>
+              <a:schemeClr val="tx1"/>
+            </a:solidFill>
+          </a:ln>
+        </p:spPr>
+        <p:style>
+          <a:lnRef idx="2">
+            <a:schemeClr val="accent1">
+              <a:shade val="50000"/>
+            </a:schemeClr>
+          </a:lnRef>
+          <a:fillRef idx="1">
+            <a:schemeClr val="accent1"/>
+          </a:fillRef>
+          <a:effectRef idx="0">
+            <a:schemeClr val="accent1"/>
+          </a:effectRef>
+          <a:fontRef idx="minor">
+            <a:schemeClr val="lt1"/>
+          </a:fontRef>
+        </p:style>
+        <p:txBody>
+          <a:bodyPr rtlCol="0" anchor="ctr"/>
+          <a:lstStyle/>
+          <a:p>
+            <a:pPr algn="ctr"/>
+            <a:r>
+              <a:rPr lang="en-US" dirty="0"/>
+              <a:t>H</a:t>
+            </a:r>
+          </a:p>
+        </p:txBody>
+      </p:sp>
+      <p:cxnSp>
+        <p:nvCxnSpPr>
+          <p:cNvPr id="17" name="Connector: Elbow 16">
+            <a:extLst>
+              <a:ext uri="{FF2B5EF4-FFF2-40B4-BE49-F238E27FC236}">
+                <a16:creationId xmlns:a16="http://schemas.microsoft.com/office/drawing/2014/main" id="{910D2B38-0DE9-4A58-8CBF-FE1270917301}"/>
+              </a:ext>
+            </a:extLst>
+          </p:cNvPr>
+          <p:cNvCxnSpPr>
+            <a:cxnSpLocks/>
+            <a:stCxn id="2" idx="3"/>
+            <a:endCxn id="16" idx="1"/>
+          </p:cNvCxnSpPr>
+          <p:nvPr/>
+        </p:nvCxnSpPr>
+        <p:spPr>
+          <a:xfrm>
+            <a:off x="2255385" y="2628702"/>
+            <a:ext cx="738104" cy="2743200"/>
+          </a:xfrm>
+          <a:prstGeom prst="bentConnector3">
+            <a:avLst>
+              <a:gd name="adj1" fmla="val 50000"/>
+            </a:avLst>
+          </a:prstGeom>
+          <a:ln w="28575">
+            <a:tailEnd type="triangle"/>
+          </a:ln>
+        </p:spPr>
+        <p:style>
+          <a:lnRef idx="1">
+            <a:schemeClr val="accent1"/>
+          </a:lnRef>
+          <a:fillRef idx="0">
+            <a:schemeClr val="accent1"/>
+          </a:fillRef>
+          <a:effectRef idx="0">
+            <a:schemeClr val="accent1"/>
+          </a:effectRef>
+          <a:fontRef idx="minor">
+            <a:schemeClr val="tx1"/>
+          </a:fontRef>
+        </p:style>
+      </p:cxnSp>
+      <p:cxnSp>
+        <p:nvCxnSpPr>
+          <p:cNvPr id="20" name="Connector: Elbow 19">
+            <a:extLst>
+              <a:ext uri="{FF2B5EF4-FFF2-40B4-BE49-F238E27FC236}">
+                <a16:creationId xmlns:a16="http://schemas.microsoft.com/office/drawing/2014/main" id="{00094DBE-3C84-4757-9935-3C40663736B6}"/>
+              </a:ext>
+            </a:extLst>
+          </p:cNvPr>
+          <p:cNvCxnSpPr>
+            <a:cxnSpLocks/>
+            <a:stCxn id="16" idx="3"/>
+            <a:endCxn id="6" idx="1"/>
+          </p:cNvCxnSpPr>
+          <p:nvPr/>
+        </p:nvCxnSpPr>
+        <p:spPr>
+          <a:xfrm flipV="1">
+            <a:off x="4527323" y="2628702"/>
+            <a:ext cx="5281983" cy="2743200"/>
+          </a:xfrm>
+          <a:prstGeom prst="bentConnector3">
+            <a:avLst>
+              <a:gd name="adj1" fmla="val 92876"/>
+            </a:avLst>
           </a:prstGeom>
           <a:ln w="28575">
             <a:tailEnd type="triangle"/>

</xml_diff>